<commit_message>
create slide 2 for part 4 channels and go routines
</commit_message>
<xml_diff>
--- a/channels and go routines/Channels and Go Routines Part 4.pptx
+++ b/channels and go routines/Channels and Go Routines Part 4.pptx
@@ -6,6 +6,7 @@
   </p:sldMasterIdLst>
   <p:sldIdLst>
     <p:sldId id="256" r:id="rId2"/>
+    <p:sldId id="257" r:id="rId3"/>
   </p:sldIdLst>
   <p:sldSz cx="12192000" cy="6858000"/>
   <p:notesSz cx="6858000" cy="9144000"/>
@@ -3456,6 +3457,699 @@
 </p:sld>
 </file>
 
+<file path=ppt/slides/slide2.xml><?xml version="1.0" encoding="utf-8"?>
+<p:sld xmlns:a="http://schemas.openxmlformats.org/drawingml/2006/main" xmlns:r="http://schemas.openxmlformats.org/officeDocument/2006/relationships" xmlns:p="http://schemas.openxmlformats.org/presentationml/2006/main">
+  <p:cSld>
+    <p:spTree>
+      <p:nvGrpSpPr>
+        <p:cNvPr id="1" name=""/>
+        <p:cNvGrpSpPr/>
+        <p:nvPr/>
+      </p:nvGrpSpPr>
+      <p:grpSpPr>
+        <a:xfrm>
+          <a:off x="0" y="0"/>
+          <a:ext cx="0" cy="0"/>
+          <a:chOff x="0" y="0"/>
+          <a:chExt cx="0" cy="0"/>
+        </a:xfrm>
+      </p:grpSpPr>
+      <p:sp>
+        <p:nvSpPr>
+          <p:cNvPr id="2" name="Rectangle 1">
+            <a:extLst>
+              <a:ext uri="{FF2B5EF4-FFF2-40B4-BE49-F238E27FC236}">
+                <a16:creationId xmlns:a16="http://schemas.microsoft.com/office/drawing/2014/main" id="{2F13E494-D405-4251-B1AD-AA4738212503}"/>
+              </a:ext>
+            </a:extLst>
+          </p:cNvPr>
+          <p:cNvSpPr/>
+          <p:nvPr/>
+        </p:nvSpPr>
+        <p:spPr>
+          <a:xfrm>
+            <a:off x="4263242" y="694706"/>
+            <a:ext cx="1832758" cy="914400"/>
+          </a:xfrm>
+          <a:prstGeom prst="rect">
+            <a:avLst/>
+          </a:prstGeom>
+          <a:solidFill>
+            <a:schemeClr val="bg1"/>
+          </a:solidFill>
+        </p:spPr>
+        <p:style>
+          <a:lnRef idx="2">
+            <a:schemeClr val="accent1">
+              <a:shade val="50000"/>
+            </a:schemeClr>
+          </a:lnRef>
+          <a:fillRef idx="1">
+            <a:schemeClr val="accent1"/>
+          </a:fillRef>
+          <a:effectRef idx="0">
+            <a:schemeClr val="accent1"/>
+          </a:effectRef>
+          <a:fontRef idx="minor">
+            <a:schemeClr val="lt1"/>
+          </a:fontRef>
+        </p:style>
+        <p:txBody>
+          <a:bodyPr rtlCol="0" anchor="ctr"/>
+          <a:lstStyle/>
+          <a:p>
+            <a:pPr algn="ctr"/>
+            <a:endParaRPr lang="en-US" dirty="0"/>
+          </a:p>
+        </p:txBody>
+      </p:sp>
+      <p:sp>
+        <p:nvSpPr>
+          <p:cNvPr id="3" name="Rectangle 2">
+            <a:extLst>
+              <a:ext uri="{FF2B5EF4-FFF2-40B4-BE49-F238E27FC236}">
+                <a16:creationId xmlns:a16="http://schemas.microsoft.com/office/drawing/2014/main" id="{707471E6-3655-451D-8187-3E77BB07920D}"/>
+              </a:ext>
+            </a:extLst>
+          </p:cNvPr>
+          <p:cNvSpPr/>
+          <p:nvPr/>
+        </p:nvSpPr>
+        <p:spPr>
+          <a:xfrm>
+            <a:off x="3354779" y="2517569"/>
+            <a:ext cx="3669476" cy="911431"/>
+          </a:xfrm>
+          <a:prstGeom prst="rect">
+            <a:avLst/>
+          </a:prstGeom>
+          <a:solidFill>
+            <a:schemeClr val="bg1"/>
+          </a:solidFill>
+        </p:spPr>
+        <p:style>
+          <a:lnRef idx="2">
+            <a:schemeClr val="accent1">
+              <a:shade val="50000"/>
+            </a:schemeClr>
+          </a:lnRef>
+          <a:fillRef idx="1">
+            <a:schemeClr val="accent1"/>
+          </a:fillRef>
+          <a:effectRef idx="0">
+            <a:schemeClr val="accent1"/>
+          </a:effectRef>
+          <a:fontRef idx="minor">
+            <a:schemeClr val="lt1"/>
+          </a:fontRef>
+        </p:style>
+        <p:txBody>
+          <a:bodyPr rtlCol="0" anchor="ctr"/>
+          <a:lstStyle/>
+          <a:p>
+            <a:pPr algn="ctr"/>
+            <a:endParaRPr lang="en-US"/>
+          </a:p>
+        </p:txBody>
+      </p:sp>
+      <p:sp>
+        <p:nvSpPr>
+          <p:cNvPr id="4" name="Rectangle 3">
+            <a:extLst>
+              <a:ext uri="{FF2B5EF4-FFF2-40B4-BE49-F238E27FC236}">
+                <a16:creationId xmlns:a16="http://schemas.microsoft.com/office/drawing/2014/main" id="{05379284-0A02-49D3-A75F-0469A448B9B6}"/>
+              </a:ext>
+            </a:extLst>
+          </p:cNvPr>
+          <p:cNvSpPr/>
+          <p:nvPr/>
+        </p:nvSpPr>
+        <p:spPr>
+          <a:xfrm>
+            <a:off x="3354779" y="4337463"/>
+            <a:ext cx="908463" cy="911431"/>
+          </a:xfrm>
+          <a:prstGeom prst="rect">
+            <a:avLst/>
+          </a:prstGeom>
+          <a:solidFill>
+            <a:schemeClr val="bg1"/>
+          </a:solidFill>
+        </p:spPr>
+        <p:style>
+          <a:lnRef idx="2">
+            <a:schemeClr val="accent1">
+              <a:shade val="50000"/>
+            </a:schemeClr>
+          </a:lnRef>
+          <a:fillRef idx="1">
+            <a:schemeClr val="accent1"/>
+          </a:fillRef>
+          <a:effectRef idx="0">
+            <a:schemeClr val="accent1"/>
+          </a:effectRef>
+          <a:fontRef idx="minor">
+            <a:schemeClr val="lt1"/>
+          </a:fontRef>
+        </p:style>
+        <p:txBody>
+          <a:bodyPr rtlCol="0" anchor="ctr"/>
+          <a:lstStyle/>
+          <a:p>
+            <a:pPr algn="ctr"/>
+            <a:endParaRPr lang="en-US"/>
+          </a:p>
+        </p:txBody>
+      </p:sp>
+      <p:sp>
+        <p:nvSpPr>
+          <p:cNvPr id="5" name="Rectangle 4">
+            <a:extLst>
+              <a:ext uri="{FF2B5EF4-FFF2-40B4-BE49-F238E27FC236}">
+                <a16:creationId xmlns:a16="http://schemas.microsoft.com/office/drawing/2014/main" id="{AA15B5B6-4973-41F8-B304-429689F18A4E}"/>
+              </a:ext>
+            </a:extLst>
+          </p:cNvPr>
+          <p:cNvSpPr/>
+          <p:nvPr/>
+        </p:nvSpPr>
+        <p:spPr>
+          <a:xfrm>
+            <a:off x="6115792" y="4327072"/>
+            <a:ext cx="908463" cy="911431"/>
+          </a:xfrm>
+          <a:prstGeom prst="rect">
+            <a:avLst/>
+          </a:prstGeom>
+          <a:solidFill>
+            <a:schemeClr val="bg1"/>
+          </a:solidFill>
+        </p:spPr>
+        <p:style>
+          <a:lnRef idx="2">
+            <a:schemeClr val="accent1">
+              <a:shade val="50000"/>
+            </a:schemeClr>
+          </a:lnRef>
+          <a:fillRef idx="1">
+            <a:schemeClr val="accent1"/>
+          </a:fillRef>
+          <a:effectRef idx="0">
+            <a:schemeClr val="accent1"/>
+          </a:effectRef>
+          <a:fontRef idx="minor">
+            <a:schemeClr val="lt1"/>
+          </a:fontRef>
+        </p:style>
+        <p:txBody>
+          <a:bodyPr rtlCol="0" anchor="ctr"/>
+          <a:lstStyle/>
+          <a:p>
+            <a:pPr algn="ctr"/>
+            <a:endParaRPr lang="en-US"/>
+          </a:p>
+        </p:txBody>
+      </p:sp>
+      <p:sp>
+        <p:nvSpPr>
+          <p:cNvPr id="6" name="Rectangle 5">
+            <a:extLst>
+              <a:ext uri="{FF2B5EF4-FFF2-40B4-BE49-F238E27FC236}">
+                <a16:creationId xmlns:a16="http://schemas.microsoft.com/office/drawing/2014/main" id="{7813296C-FA18-4EE7-80BD-C3FA58AB6C0A}"/>
+              </a:ext>
+            </a:extLst>
+          </p:cNvPr>
+          <p:cNvSpPr/>
+          <p:nvPr/>
+        </p:nvSpPr>
+        <p:spPr>
+          <a:xfrm>
+            <a:off x="4847111" y="4337463"/>
+            <a:ext cx="908463" cy="911431"/>
+          </a:xfrm>
+          <a:prstGeom prst="rect">
+            <a:avLst/>
+          </a:prstGeom>
+          <a:solidFill>
+            <a:schemeClr val="bg1"/>
+          </a:solidFill>
+        </p:spPr>
+        <p:style>
+          <a:lnRef idx="2">
+            <a:schemeClr val="accent1">
+              <a:shade val="50000"/>
+            </a:schemeClr>
+          </a:lnRef>
+          <a:fillRef idx="1">
+            <a:schemeClr val="accent1"/>
+          </a:fillRef>
+          <a:effectRef idx="0">
+            <a:schemeClr val="accent1"/>
+          </a:effectRef>
+          <a:fontRef idx="minor">
+            <a:schemeClr val="lt1"/>
+          </a:fontRef>
+        </p:style>
+        <p:txBody>
+          <a:bodyPr rtlCol="0" anchor="ctr"/>
+          <a:lstStyle/>
+          <a:p>
+            <a:pPr algn="ctr"/>
+            <a:endParaRPr lang="en-US"/>
+          </a:p>
+        </p:txBody>
+      </p:sp>
+      <p:cxnSp>
+        <p:nvCxnSpPr>
+          <p:cNvPr id="8" name="Straight Arrow Connector 7">
+            <a:extLst>
+              <a:ext uri="{FF2B5EF4-FFF2-40B4-BE49-F238E27FC236}">
+                <a16:creationId xmlns:a16="http://schemas.microsoft.com/office/drawing/2014/main" id="{E62DBB1B-1D23-46F0-BBFD-2DE088BAB12A}"/>
+              </a:ext>
+            </a:extLst>
+          </p:cNvPr>
+          <p:cNvCxnSpPr>
+            <a:endCxn id="4" idx="0"/>
+          </p:cNvCxnSpPr>
+          <p:nvPr/>
+        </p:nvCxnSpPr>
+        <p:spPr>
+          <a:xfrm>
+            <a:off x="3809010" y="3427516"/>
+            <a:ext cx="1" cy="909947"/>
+          </a:xfrm>
+          <a:prstGeom prst="straightConnector1">
+            <a:avLst/>
+          </a:prstGeom>
+          <a:ln>
+            <a:headEnd type="triangle"/>
+            <a:tailEnd type="triangle"/>
+          </a:ln>
+        </p:spPr>
+        <p:style>
+          <a:lnRef idx="1">
+            <a:schemeClr val="accent1"/>
+          </a:lnRef>
+          <a:fillRef idx="0">
+            <a:schemeClr val="accent1"/>
+          </a:fillRef>
+          <a:effectRef idx="0">
+            <a:schemeClr val="accent1"/>
+          </a:effectRef>
+          <a:fontRef idx="minor">
+            <a:schemeClr val="tx1"/>
+          </a:fontRef>
+        </p:style>
+      </p:cxnSp>
+      <p:cxnSp>
+        <p:nvCxnSpPr>
+          <p:cNvPr id="9" name="Straight Arrow Connector 8">
+            <a:extLst>
+              <a:ext uri="{FF2B5EF4-FFF2-40B4-BE49-F238E27FC236}">
+                <a16:creationId xmlns:a16="http://schemas.microsoft.com/office/drawing/2014/main" id="{61561DA8-93AF-4606-A767-19AF89F5DADF}"/>
+              </a:ext>
+            </a:extLst>
+          </p:cNvPr>
+          <p:cNvCxnSpPr/>
+          <p:nvPr/>
+        </p:nvCxnSpPr>
+        <p:spPr>
+          <a:xfrm>
+            <a:off x="5301341" y="3427516"/>
+            <a:ext cx="1" cy="909947"/>
+          </a:xfrm>
+          <a:prstGeom prst="straightConnector1">
+            <a:avLst/>
+          </a:prstGeom>
+          <a:ln>
+            <a:headEnd type="triangle"/>
+            <a:tailEnd type="triangle"/>
+          </a:ln>
+        </p:spPr>
+        <p:style>
+          <a:lnRef idx="1">
+            <a:schemeClr val="accent1"/>
+          </a:lnRef>
+          <a:fillRef idx="0">
+            <a:schemeClr val="accent1"/>
+          </a:fillRef>
+          <a:effectRef idx="0">
+            <a:schemeClr val="accent1"/>
+          </a:effectRef>
+          <a:fontRef idx="minor">
+            <a:schemeClr val="tx1"/>
+          </a:fontRef>
+        </p:style>
+      </p:cxnSp>
+      <p:cxnSp>
+        <p:nvCxnSpPr>
+          <p:cNvPr id="10" name="Straight Arrow Connector 9">
+            <a:extLst>
+              <a:ext uri="{FF2B5EF4-FFF2-40B4-BE49-F238E27FC236}">
+                <a16:creationId xmlns:a16="http://schemas.microsoft.com/office/drawing/2014/main" id="{5F08AF70-1D69-41E0-B580-2A0D39164565}"/>
+              </a:ext>
+            </a:extLst>
+          </p:cNvPr>
+          <p:cNvCxnSpPr/>
+          <p:nvPr/>
+        </p:nvCxnSpPr>
+        <p:spPr>
+          <a:xfrm>
+            <a:off x="6567548" y="3427516"/>
+            <a:ext cx="1" cy="909947"/>
+          </a:xfrm>
+          <a:prstGeom prst="straightConnector1">
+            <a:avLst/>
+          </a:prstGeom>
+          <a:ln>
+            <a:headEnd type="triangle"/>
+            <a:tailEnd type="triangle"/>
+          </a:ln>
+        </p:spPr>
+        <p:style>
+          <a:lnRef idx="1">
+            <a:schemeClr val="accent1"/>
+          </a:lnRef>
+          <a:fillRef idx="0">
+            <a:schemeClr val="accent1"/>
+          </a:fillRef>
+          <a:effectRef idx="0">
+            <a:schemeClr val="accent1"/>
+          </a:effectRef>
+          <a:fontRef idx="minor">
+            <a:schemeClr val="tx1"/>
+          </a:fontRef>
+        </p:style>
+      </p:cxnSp>
+      <p:cxnSp>
+        <p:nvCxnSpPr>
+          <p:cNvPr id="12" name="Straight Arrow Connector 11">
+            <a:extLst>
+              <a:ext uri="{FF2B5EF4-FFF2-40B4-BE49-F238E27FC236}">
+                <a16:creationId xmlns:a16="http://schemas.microsoft.com/office/drawing/2014/main" id="{F9D81831-873A-4210-BB55-0F59F9A2CE69}"/>
+              </a:ext>
+            </a:extLst>
+          </p:cNvPr>
+          <p:cNvCxnSpPr/>
+          <p:nvPr/>
+        </p:nvCxnSpPr>
+        <p:spPr>
+          <a:xfrm>
+            <a:off x="4560125" y="1609106"/>
+            <a:ext cx="0" cy="908463"/>
+          </a:xfrm>
+          <a:prstGeom prst="straightConnector1">
+            <a:avLst/>
+          </a:prstGeom>
+          <a:ln>
+            <a:tailEnd type="triangle"/>
+          </a:ln>
+        </p:spPr>
+        <p:style>
+          <a:lnRef idx="1">
+            <a:schemeClr val="accent1"/>
+          </a:lnRef>
+          <a:fillRef idx="0">
+            <a:schemeClr val="accent1"/>
+          </a:fillRef>
+          <a:effectRef idx="0">
+            <a:schemeClr val="accent1"/>
+          </a:effectRef>
+          <a:fontRef idx="minor">
+            <a:schemeClr val="tx1"/>
+          </a:fontRef>
+        </p:style>
+      </p:cxnSp>
+      <p:cxnSp>
+        <p:nvCxnSpPr>
+          <p:cNvPr id="14" name="Straight Arrow Connector 13">
+            <a:extLst>
+              <a:ext uri="{FF2B5EF4-FFF2-40B4-BE49-F238E27FC236}">
+                <a16:creationId xmlns:a16="http://schemas.microsoft.com/office/drawing/2014/main" id="{FD1208D2-4B2D-4753-B6AF-6A51EB3305AB}"/>
+              </a:ext>
+            </a:extLst>
+          </p:cNvPr>
+          <p:cNvCxnSpPr>
+            <a:cxnSpLocks/>
+          </p:cNvCxnSpPr>
+          <p:nvPr/>
+        </p:nvCxnSpPr>
+        <p:spPr>
+          <a:xfrm flipV="1">
+            <a:off x="5755574" y="1609106"/>
+            <a:ext cx="0" cy="908464"/>
+          </a:xfrm>
+          <a:prstGeom prst="straightConnector1">
+            <a:avLst/>
+          </a:prstGeom>
+          <a:ln>
+            <a:tailEnd type="triangle"/>
+          </a:ln>
+        </p:spPr>
+        <p:style>
+          <a:lnRef idx="1">
+            <a:schemeClr val="accent1"/>
+          </a:lnRef>
+          <a:fillRef idx="0">
+            <a:schemeClr val="accent1"/>
+          </a:fillRef>
+          <a:effectRef idx="0">
+            <a:schemeClr val="accent1"/>
+          </a:effectRef>
+          <a:fontRef idx="minor">
+            <a:schemeClr val="tx1"/>
+          </a:fontRef>
+        </p:style>
+      </p:cxnSp>
+      <p:sp>
+        <p:nvSpPr>
+          <p:cNvPr id="17" name="TextBox 16">
+            <a:extLst>
+              <a:ext uri="{FF2B5EF4-FFF2-40B4-BE49-F238E27FC236}">
+                <a16:creationId xmlns:a16="http://schemas.microsoft.com/office/drawing/2014/main" id="{E16F6879-140C-4F62-A15B-05967AEF2FF7}"/>
+              </a:ext>
+            </a:extLst>
+          </p:cNvPr>
+          <p:cNvSpPr txBox="1"/>
+          <p:nvPr/>
+        </p:nvSpPr>
+        <p:spPr>
+          <a:xfrm>
+            <a:off x="4560125" y="878774"/>
+            <a:ext cx="1195447" cy="646331"/>
+          </a:xfrm>
+          <a:prstGeom prst="rect">
+            <a:avLst/>
+          </a:prstGeom>
+          <a:noFill/>
+        </p:spPr>
+        <p:txBody>
+          <a:bodyPr wrap="square" rtlCol="0">
+            <a:spAutoFit/>
+          </a:bodyPr>
+          <a:lstStyle/>
+          <a:p>
+            <a:r>
+              <a:rPr lang="en-US" dirty="0"/>
+              <a:t>One CPU</a:t>
+            </a:r>
+          </a:p>
+          <a:p>
+            <a:r>
+              <a:rPr lang="en-US" dirty="0"/>
+              <a:t>     Core</a:t>
+            </a:r>
+          </a:p>
+        </p:txBody>
+      </p:sp>
+      <p:sp>
+        <p:nvSpPr>
+          <p:cNvPr id="18" name="TextBox 17">
+            <a:extLst>
+              <a:ext uri="{FF2B5EF4-FFF2-40B4-BE49-F238E27FC236}">
+                <a16:creationId xmlns:a16="http://schemas.microsoft.com/office/drawing/2014/main" id="{B4A5C466-142E-4780-96F2-4F5C735C2885}"/>
+              </a:ext>
+            </a:extLst>
+          </p:cNvPr>
+          <p:cNvSpPr txBox="1"/>
+          <p:nvPr/>
+        </p:nvSpPr>
+        <p:spPr>
+          <a:xfrm>
+            <a:off x="4384962" y="2731325"/>
+            <a:ext cx="1832757" cy="369332"/>
+          </a:xfrm>
+          <a:prstGeom prst="rect">
+            <a:avLst/>
+          </a:prstGeom>
+          <a:noFill/>
+        </p:spPr>
+        <p:txBody>
+          <a:bodyPr wrap="square" rtlCol="0">
+            <a:spAutoFit/>
+          </a:bodyPr>
+          <a:lstStyle/>
+          <a:p>
+            <a:r>
+              <a:rPr lang="en-US" dirty="0"/>
+              <a:t>Go Scheduler</a:t>
+            </a:r>
+          </a:p>
+        </p:txBody>
+      </p:sp>
+      <p:sp>
+        <p:nvSpPr>
+          <p:cNvPr id="19" name="TextBox 18">
+            <a:extLst>
+              <a:ext uri="{FF2B5EF4-FFF2-40B4-BE49-F238E27FC236}">
+                <a16:creationId xmlns:a16="http://schemas.microsoft.com/office/drawing/2014/main" id="{1AA87A8A-CF15-4C93-9AA2-BAF63AC091EB}"/>
+              </a:ext>
+            </a:extLst>
+          </p:cNvPr>
+          <p:cNvSpPr txBox="1"/>
+          <p:nvPr/>
+        </p:nvSpPr>
+        <p:spPr>
+          <a:xfrm>
+            <a:off x="3354779" y="4349362"/>
+            <a:ext cx="908463" cy="584775"/>
+          </a:xfrm>
+          <a:prstGeom prst="rect">
+            <a:avLst/>
+          </a:prstGeom>
+          <a:noFill/>
+        </p:spPr>
+        <p:txBody>
+          <a:bodyPr wrap="square" rtlCol="0">
+            <a:spAutoFit/>
+          </a:bodyPr>
+          <a:lstStyle/>
+          <a:p>
+            <a:r>
+              <a:rPr lang="en-US" sz="1600" dirty="0"/>
+              <a:t>Go Routine</a:t>
+            </a:r>
+          </a:p>
+        </p:txBody>
+      </p:sp>
+      <p:sp>
+        <p:nvSpPr>
+          <p:cNvPr id="20" name="TextBox 19">
+            <a:extLst>
+              <a:ext uri="{FF2B5EF4-FFF2-40B4-BE49-F238E27FC236}">
+                <a16:creationId xmlns:a16="http://schemas.microsoft.com/office/drawing/2014/main" id="{206EE34A-DB06-4ED2-A3EC-5BF6F015C590}"/>
+              </a:ext>
+            </a:extLst>
+          </p:cNvPr>
+          <p:cNvSpPr txBox="1"/>
+          <p:nvPr/>
+        </p:nvSpPr>
+        <p:spPr>
+          <a:xfrm>
+            <a:off x="4822370" y="4349361"/>
+            <a:ext cx="908463" cy="584775"/>
+          </a:xfrm>
+          <a:prstGeom prst="rect">
+            <a:avLst/>
+          </a:prstGeom>
+          <a:noFill/>
+        </p:spPr>
+        <p:txBody>
+          <a:bodyPr wrap="square" rtlCol="0">
+            <a:spAutoFit/>
+          </a:bodyPr>
+          <a:lstStyle/>
+          <a:p>
+            <a:r>
+              <a:rPr lang="en-US" sz="1600" dirty="0"/>
+              <a:t>Go Routine</a:t>
+            </a:r>
+          </a:p>
+        </p:txBody>
+      </p:sp>
+      <p:sp>
+        <p:nvSpPr>
+          <p:cNvPr id="21" name="TextBox 20">
+            <a:extLst>
+              <a:ext uri="{FF2B5EF4-FFF2-40B4-BE49-F238E27FC236}">
+                <a16:creationId xmlns:a16="http://schemas.microsoft.com/office/drawing/2014/main" id="{CC49A85D-2358-468B-9FD2-B9D959F2581F}"/>
+              </a:ext>
+            </a:extLst>
+          </p:cNvPr>
+          <p:cNvSpPr txBox="1"/>
+          <p:nvPr/>
+        </p:nvSpPr>
+        <p:spPr>
+          <a:xfrm>
+            <a:off x="6096000" y="4327072"/>
+            <a:ext cx="908463" cy="584775"/>
+          </a:xfrm>
+          <a:prstGeom prst="rect">
+            <a:avLst/>
+          </a:prstGeom>
+          <a:noFill/>
+        </p:spPr>
+        <p:txBody>
+          <a:bodyPr wrap="square" rtlCol="0">
+            <a:spAutoFit/>
+          </a:bodyPr>
+          <a:lstStyle/>
+          <a:p>
+            <a:r>
+              <a:rPr lang="en-US" sz="1600" dirty="0"/>
+              <a:t>Go Routine</a:t>
+            </a:r>
+          </a:p>
+        </p:txBody>
+      </p:sp>
+      <p:sp>
+        <p:nvSpPr>
+          <p:cNvPr id="22" name="TextBox 21">
+            <a:extLst>
+              <a:ext uri="{FF2B5EF4-FFF2-40B4-BE49-F238E27FC236}">
+                <a16:creationId xmlns:a16="http://schemas.microsoft.com/office/drawing/2014/main" id="{14F85EB8-676B-4F7A-AA92-73FFDD8B384C}"/>
+              </a:ext>
+            </a:extLst>
+          </p:cNvPr>
+          <p:cNvSpPr txBox="1"/>
+          <p:nvPr/>
+        </p:nvSpPr>
+        <p:spPr>
+          <a:xfrm>
+            <a:off x="8176161" y="1609106"/>
+            <a:ext cx="2885699" cy="830997"/>
+          </a:xfrm>
+          <a:prstGeom prst="rect">
+            <a:avLst/>
+          </a:prstGeom>
+          <a:noFill/>
+        </p:spPr>
+        <p:txBody>
+          <a:bodyPr wrap="square" rtlCol="0">
+            <a:spAutoFit/>
+          </a:bodyPr>
+          <a:lstStyle/>
+          <a:p>
+            <a:r>
+              <a:rPr lang="en-US" sz="1600" dirty="0"/>
+              <a:t>Scheduler runs one routine until it finishes or makes a blocking call (i.e. HTTP request)</a:t>
+            </a:r>
+          </a:p>
+        </p:txBody>
+      </p:sp>
+    </p:spTree>
+    <p:extLst>
+      <p:ext uri="{BB962C8B-B14F-4D97-AF65-F5344CB8AC3E}">
+        <p14:creationId xmlns:p14="http://schemas.microsoft.com/office/powerpoint/2010/main" val="1230834535"/>
+      </p:ext>
+    </p:extLst>
+  </p:cSld>
+  <p:clrMapOvr>
+    <a:masterClrMapping/>
+  </p:clrMapOvr>
+</p:sld>
+</file>
+
 <file path=ppt/theme/theme1.xml><?xml version="1.0" encoding="utf-8"?>
 <a:theme xmlns:a="http://schemas.openxmlformats.org/drawingml/2006/main" name="Frame">
   <a:themeElements>

</xml_diff>